<commit_message>
dump proposed reference price for Scott Smith at SPP
</commit_message>
<xml_diff>
--- a/ppt/Compare_Current_and_Proposed_Reference_Price.pptx
+++ b/ppt/Compare_Current_and_Proposed_Reference_Price.pptx
@@ -217,7 +217,7 @@
           <a:p>
             <a:fld id="{DC9FF35D-67E9-443F-A58B-481559A40312}" type="datetimeFigureOut">
               <a:rPr lang="en-US" smtClean="0"/>
-              <a:t>9/7/2017</a:t>
+              <a:t>9/13/2017</a:t>
             </a:fld>
             <a:endParaRPr lang="en-US"/>
           </a:p>
@@ -1020,7 +1020,7 @@
           <a:p>
             <a:fld id="{15F1E40C-1ADA-49EE-97E6-66D3E249BA19}" type="datetime1">
               <a:rPr lang="en-US" smtClean="0"/>
-              <a:t>9/7/2017</a:t>
+              <a:t>9/13/2017</a:t>
             </a:fld>
             <a:endParaRPr lang="en-US"/>
           </a:p>
@@ -1383,7 +1383,7 @@
             <a:fld id="{0F631D50-F0AA-46A8-84F7-AFEADD7F3562}" type="datetime1">
               <a:rPr lang="en-US" smtClean="0"/>
               <a:pPr/>
-              <a:t>9/7/2017</a:t>
+              <a:t>9/13/2017</a:t>
             </a:fld>
             <a:endParaRPr lang="en-US"/>
           </a:p>
@@ -1772,7 +1772,7 @@
           <a:p>
             <a:fld id="{66269BD1-B55D-45D2-A064-5404BCD67C62}" type="datetime1">
               <a:rPr lang="en-US" smtClean="0"/>
-              <a:t>9/7/2017</a:t>
+              <a:t>9/13/2017</a:t>
             </a:fld>
             <a:endParaRPr lang="en-US"/>
           </a:p>
@@ -2117,7 +2117,7 @@
           <a:p>
             <a:fld id="{A897F7A3-A02E-43B7-A35D-28422C891F34}" type="datetime1">
               <a:rPr lang="en-US" smtClean="0"/>
-              <a:t>9/7/2017</a:t>
+              <a:t>9/13/2017</a:t>
             </a:fld>
             <a:endParaRPr lang="en-US"/>
           </a:p>
@@ -2297,7 +2297,7 @@
           <a:p>
             <a:fld id="{D3235EA8-B38B-49E7-A85C-5CBC6D007238}" type="datetime1">
               <a:rPr lang="en-US" smtClean="0"/>
-              <a:t>9/7/2017</a:t>
+              <a:t>9/13/2017</a:t>
             </a:fld>
             <a:endParaRPr lang="en-US"/>
           </a:p>
@@ -2579,7 +2579,7 @@
           <a:p>
             <a:fld id="{9DAC76DD-E0E5-4982-B60F-3E1F6AAD9050}" type="datetime1">
               <a:rPr lang="en-US" smtClean="0"/>
-              <a:t>9/7/2017</a:t>
+              <a:t>9/13/2017</a:t>
             </a:fld>
             <a:endParaRPr lang="en-US"/>
           </a:p>
@@ -2993,7 +2993,7 @@
           <a:p>
             <a:r>
               <a:rPr lang="en-US" dirty="0" smtClean="0"/>
-              <a:t>9/--/2017</a:t>
+              <a:t>9/21/2017</a:t>
             </a:r>
             <a:endParaRPr lang="en-US" dirty="0"/>
           </a:p>
@@ -3151,7 +3151,7 @@
           <a:p>
             <a:fld id="{66269BD1-B55D-45D2-A064-5404BCD67C62}" type="datetime1">
               <a:rPr lang="en-US" smtClean="0"/>
-              <a:t>9/7/2017</a:t>
+              <a:t>9/13/2017</a:t>
             </a:fld>
             <a:endParaRPr lang="en-US"/>
           </a:p>
@@ -3414,7 +3414,7 @@
           <a:p>
             <a:fld id="{66269BD1-B55D-45D2-A064-5404BCD67C62}" type="datetime1">
               <a:rPr lang="en-US" smtClean="0"/>
-              <a:t>9/7/2017</a:t>
+              <a:t>9/13/2017</a:t>
             </a:fld>
             <a:endParaRPr lang="en-US"/>
           </a:p>
@@ -3677,7 +3677,7 @@
           <a:p>
             <a:fld id="{66269BD1-B55D-45D2-A064-5404BCD67C62}" type="datetime1">
               <a:rPr lang="en-US" smtClean="0"/>
-              <a:t>9/7/2017</a:t>
+              <a:t>9/13/2017</a:t>
             </a:fld>
             <a:endParaRPr lang="en-US"/>
           </a:p>
@@ -3940,7 +3940,7 @@
           <a:p>
             <a:fld id="{66269BD1-B55D-45D2-A064-5404BCD67C62}" type="datetime1">
               <a:rPr lang="en-US" smtClean="0"/>
-              <a:t>9/7/2017</a:t>
+              <a:t>9/13/2017</a:t>
             </a:fld>
             <a:endParaRPr lang="en-US"/>
           </a:p>
@@ -4203,7 +4203,7 @@
           <a:p>
             <a:fld id="{66269BD1-B55D-45D2-A064-5404BCD67C62}" type="datetime1">
               <a:rPr lang="en-US" smtClean="0"/>
-              <a:t>9/7/2017</a:t>
+              <a:t>9/13/2017</a:t>
             </a:fld>
             <a:endParaRPr lang="en-US"/>
           </a:p>
@@ -4466,7 +4466,7 @@
           <a:p>
             <a:fld id="{66269BD1-B55D-45D2-A064-5404BCD67C62}" type="datetime1">
               <a:rPr lang="en-US" smtClean="0"/>
-              <a:t>9/7/2017</a:t>
+              <a:t>9/13/2017</a:t>
             </a:fld>
             <a:endParaRPr lang="en-US"/>
           </a:p>
@@ -4731,7 +4731,7 @@
           <a:p>
             <a:fld id="{66269BD1-B55D-45D2-A064-5404BCD67C62}" type="datetime1">
               <a:rPr lang="en-US" smtClean="0"/>
-              <a:t>9/7/2017</a:t>
+              <a:t>9/13/2017</a:t>
             </a:fld>
             <a:endParaRPr lang="en-US"/>
           </a:p>
@@ -4994,7 +4994,7 @@
           <a:p>
             <a:fld id="{66269BD1-B55D-45D2-A064-5404BCD67C62}" type="datetime1">
               <a:rPr lang="en-US" smtClean="0"/>
-              <a:t>9/7/2017</a:t>
+              <a:t>9/13/2017</a:t>
             </a:fld>
             <a:endParaRPr lang="en-US"/>
           </a:p>
@@ -5273,7 +5273,7 @@
           <a:p>
             <a:fld id="{66269BD1-B55D-45D2-A064-5404BCD67C62}" type="datetime1">
               <a:rPr lang="en-US" smtClean="0"/>
-              <a:t>9/7/2017</a:t>
+              <a:t>9/13/2017</a:t>
             </a:fld>
             <a:endParaRPr lang="en-US"/>
           </a:p>
@@ -5500,7 +5500,7 @@
           <a:p>
             <a:fld id="{15F1E40C-1ADA-49EE-97E6-66D3E249BA19}" type="datetime1">
               <a:rPr lang="en-US" smtClean="0"/>
-              <a:t>9/7/2017</a:t>
+              <a:t>9/13/2017</a:t>
             </a:fld>
             <a:endParaRPr lang="en-US"/>
           </a:p>
@@ -5653,7 +5653,7 @@
           <a:p>
             <a:fld id="{02EE789E-1D84-4897-8ED5-C6C6A8AFBCC7}" type="datetime1">
               <a:rPr lang="en-US" smtClean="0"/>
-              <a:t>9/7/2017</a:t>
+              <a:t>9/13/2017</a:t>
             </a:fld>
             <a:endParaRPr lang="en-US"/>
           </a:p>
@@ -5824,7 +5824,7 @@
           <a:p>
             <a:fld id="{15F1E40C-1ADA-49EE-97E6-66D3E249BA19}" type="datetime1">
               <a:rPr lang="en-US" smtClean="0"/>
-              <a:t>9/7/2017</a:t>
+              <a:t>9/13/2017</a:t>
             </a:fld>
             <a:endParaRPr lang="en-US"/>
           </a:p>
@@ -5994,7 +5994,7 @@
           <a:p>
             <a:fld id="{15F1E40C-1ADA-49EE-97E6-66D3E249BA19}" type="datetime1">
               <a:rPr lang="en-US" smtClean="0"/>
-              <a:t>9/7/2017</a:t>
+              <a:t>9/13/2017</a:t>
             </a:fld>
             <a:endParaRPr lang="en-US"/>
           </a:p>
@@ -6231,7 +6231,7 @@
           <a:p>
             <a:fld id="{193E42F9-7246-46BA-ACFD-939E0BDD16E6}" type="datetime1">
               <a:rPr lang="en-US" smtClean="0"/>
-              <a:t>9/7/2017</a:t>
+              <a:t>9/13/2017</a:t>
             </a:fld>
             <a:endParaRPr lang="en-US"/>
           </a:p>
@@ -6321,8 +6321,8 @@
           </a:p>
         </p:txBody>
       </p:sp>
-      <mc:AlternateContent xmlns:mc="http://schemas.openxmlformats.org/markup-compatibility/2006" xmlns:a14="http://schemas.microsoft.com/office/drawing/2010/main">
-        <mc:Choice Requires="a14">
+      <mc:AlternateContent xmlns:mc="http://schemas.openxmlformats.org/markup-compatibility/2006">
+        <mc:Choice xmlns:a14="http://schemas.microsoft.com/office/drawing/2010/main" Requires="a14">
           <p:sp>
             <p:nvSpPr>
               <p:cNvPr id="3" name="Content Placeholder 2"/>
@@ -6428,7 +6428,19 @@
                 </a:br>
                 <a:r>
                   <a:rPr lang="en-US" dirty="0" smtClean="0"/>
-                  <a:t>implies that there is significant topological changes to where historical hourly values are no longer sufficient to derive a </a:t>
+                  <a:t>implies that there </a:t>
+                </a:r>
+                <a:r>
+                  <a:rPr lang="en-US" dirty="0" smtClean="0"/>
+                  <a:t>are</a:t>
+                </a:r>
+                <a:r>
+                  <a:rPr lang="en-US" dirty="0" smtClean="0"/>
+                  <a:t> </a:t>
+                </a:r>
+                <a:r>
+                  <a:rPr lang="en-US" dirty="0" smtClean="0"/>
+                  <a:t>significant topological changes to where historical hourly values are no longer sufficient to derive a </a:t>
                 </a:r>
                 <a:r>
                   <a:rPr lang="en-US" dirty="0" err="1" smtClean="0"/>
@@ -6442,7 +6454,7 @@
             </p:txBody>
           </p:sp>
         </mc:Choice>
-        <mc:Fallback xmlns="">
+        <mc:Fallback>
           <p:sp>
             <p:nvSpPr>
               <p:cNvPr id="3" name="Content Placeholder 2"/>
@@ -6517,52 +6529,9 @@
           <a:p>
             <a:fld id="{15F1E40C-1ADA-49EE-97E6-66D3E249BA19}" type="datetime1">
               <a:rPr lang="en-US" smtClean="0"/>
-              <a:t>9/7/2017</a:t>
+              <a:t>9/13/2017</a:t>
             </a:fld>
             <a:endParaRPr lang="en-US"/>
-          </a:p>
-        </p:txBody>
-      </p:sp>
-      <p:sp>
-        <p:nvSpPr>
-          <p:cNvPr id="6" name="TextBox 5"/>
-          <p:cNvSpPr txBox="1"/>
-          <p:nvPr/>
-        </p:nvSpPr>
-        <p:spPr>
-          <a:xfrm>
-            <a:off x="6620552" y="3489828"/>
-            <a:ext cx="2523448" cy="369332"/>
-          </a:xfrm>
-          <a:prstGeom prst="rect">
-            <a:avLst/>
-          </a:prstGeom>
-          <a:noFill/>
-        </p:spPr>
-        <p:txBody>
-          <a:bodyPr wrap="none" rtlCol="0">
-            <a:spAutoFit/>
-          </a:bodyPr>
-          <a:lstStyle/>
-          <a:p>
-            <a:r>
-              <a:rPr lang="en-US" dirty="0" err="1" smtClean="0">
-                <a:latin typeface="Batang" panose="02030600000101010101" pitchFamily="18" charset="-127"/>
-                <a:ea typeface="Batang" panose="02030600000101010101" pitchFamily="18" charset="-127"/>
-              </a:rPr>
-              <a:t>DaCongest</a:t>
-            </a:r>
-            <a:r>
-              <a:rPr lang="en-US" dirty="0" smtClean="0">
-                <a:latin typeface="Batang" panose="02030600000101010101" pitchFamily="18" charset="-127"/>
-                <a:ea typeface="Batang" panose="02030600000101010101" pitchFamily="18" charset="-127"/>
-              </a:rPr>
-              <a:t> - Current</a:t>
-            </a:r>
-            <a:endParaRPr lang="en-US" dirty="0">
-              <a:latin typeface="Batang" panose="02030600000101010101" pitchFamily="18" charset="-127"/>
-              <a:ea typeface="Batang" panose="02030600000101010101" pitchFamily="18" charset="-127"/>
-            </a:endParaRPr>
           </a:p>
         </p:txBody>
       </p:sp>
@@ -6667,7 +6636,7 @@
           <a:p>
             <a:fld id="{15F1E40C-1ADA-49EE-97E6-66D3E249BA19}" type="datetime1">
               <a:rPr lang="en-US" smtClean="0"/>
-              <a:t>9/7/2017</a:t>
+              <a:t>9/13/2017</a:t>
             </a:fld>
             <a:endParaRPr lang="en-US"/>
           </a:p>
@@ -8674,7 +8643,7 @@
           <a:p>
             <a:fld id="{15F1E40C-1ADA-49EE-97E6-66D3E249BA19}" type="datetime1">
               <a:rPr lang="en-US" smtClean="0"/>
-              <a:t>9/7/2017</a:t>
+              <a:t>9/13/2017</a:t>
             </a:fld>
             <a:endParaRPr lang="en-US"/>
           </a:p>
@@ -8813,7 +8782,7 @@
           <a:p>
             <a:fld id="{15F1E40C-1ADA-49EE-97E6-66D3E249BA19}" type="datetime1">
               <a:rPr lang="en-US" smtClean="0"/>
-              <a:t>9/7/2017</a:t>
+              <a:t>9/13/2017</a:t>
             </a:fld>
             <a:endParaRPr lang="en-US"/>
           </a:p>
@@ -9080,7 +9049,7 @@
           <a:p>
             <a:fld id="{15F1E40C-1ADA-49EE-97E6-66D3E249BA19}" type="datetime1">
               <a:rPr lang="en-US" smtClean="0"/>
-              <a:t>9/7/2017</a:t>
+              <a:t>9/13/2017</a:t>
             </a:fld>
             <a:endParaRPr lang="en-US"/>
           </a:p>
@@ -9402,7 +9371,7 @@
           <a:p>
             <a:fld id="{66269BD1-B55D-45D2-A064-5404BCD67C62}" type="datetime1">
               <a:rPr lang="en-US" smtClean="0"/>
-              <a:t>9/7/2017</a:t>
+              <a:t>9/13/2017</a:t>
             </a:fld>
             <a:endParaRPr lang="en-US"/>
           </a:p>

</xml_diff>